<commit_message>
Updated Slide to say Prompt instead of Alert
</commit_message>
<xml_diff>
--- a/0419-tth-class-content/03-intro-js-hangman-dom/3.2/UT-JumpingForJS.pptx
+++ b/0419-tth-class-content/03-intro-js-hangman-dom/3.2/UT-JumpingForJS.pptx
@@ -265,7 +265,7 @@
           <a:p>
             <a:fld id="{51A969EA-8566-418D-AC96-BC5F6E9FAB6C}" type="datetimeFigureOut">
               <a:rPr lang="en-US" smtClean="0"/>
-              <a:t>5/4/16</a:t>
+              <a:t>5/6/16</a:t>
             </a:fld>
             <a:endParaRPr lang="en-US"/>
           </a:p>
@@ -430,7 +430,7 @@
           <a:p>
             <a:fld id="{33B07B4B-74D8-4C42-A719-1F93879497F8}" type="datetimeFigureOut">
               <a:rPr lang="en-US" smtClean="0"/>
-              <a:t>5/4/16</a:t>
+              <a:t>5/6/16</a:t>
             </a:fld>
             <a:endParaRPr lang="en-US"/>
           </a:p>
@@ -8152,7 +8152,7 @@
           <a:p>
             <a:fld id="{06F2DAE4-C87D-464C-8529-C68309DD1CFC}" type="datetimeFigureOut">
               <a:rPr lang="en-US" smtClean="0"/>
-              <a:t>5/4/16</a:t>
+              <a:t>5/6/16</a:t>
             </a:fld>
             <a:endParaRPr lang="en-US"/>
           </a:p>
@@ -8664,7 +8664,7 @@
           <a:p>
             <a:fld id="{B65C9255-9F07-4181-9AD2-897FFC0A3B7E}" type="datetimeFigureOut">
               <a:rPr lang="en-US" smtClean="0"/>
-              <a:t>5/4/16</a:t>
+              <a:t>5/6/16</a:t>
             </a:fld>
             <a:endParaRPr lang="en-US"/>
           </a:p>
@@ -9194,7 +9194,7 @@
           <a:p>
             <a:fld id="{B65C9255-9F07-4181-9AD2-897FFC0A3B7E}" type="datetimeFigureOut">
               <a:rPr lang="en-US" smtClean="0"/>
-              <a:t>5/4/16</a:t>
+              <a:t>5/6/16</a:t>
             </a:fld>
             <a:endParaRPr lang="en-US"/>
           </a:p>
@@ -9724,7 +9724,7 @@
           <a:p>
             <a:fld id="{B65C9255-9F07-4181-9AD2-897FFC0A3B7E}" type="datetimeFigureOut">
               <a:rPr lang="en-US" smtClean="0"/>
-              <a:t>5/4/16</a:t>
+              <a:t>5/6/16</a:t>
             </a:fld>
             <a:endParaRPr lang="en-US"/>
           </a:p>
@@ -10160,11 +10160,7 @@
           <a:p>
             <a:r>
               <a:rPr lang="en-US" dirty="0" smtClean="0"/>
-              <a:t>May</a:t>
-            </a:r>
-            <a:r>
-              <a:rPr lang="en-US" dirty="0" smtClean="0"/>
-              <a:t> </a:t>
+              <a:t>May </a:t>
             </a:r>
             <a:r>
               <a:rPr lang="en-US" dirty="0"/>
@@ -10855,12 +10851,12 @@
               </a:spcBef>
             </a:pPr>
             <a:r>
-              <a:rPr lang="en-US" b="1" dirty="0">
+              <a:rPr lang="en-US" b="1" dirty="0" smtClean="0">
                 <a:latin typeface="Arial" panose="020B0604020202020204" pitchFamily="34" charset="0"/>
                 <a:ea typeface="Roboto" panose="02000000000000000000" pitchFamily="2" charset="0"/>
                 <a:cs typeface="Arial" panose="020B0604020202020204" pitchFamily="34" charset="0"/>
               </a:rPr>
-              <a:t>Alert </a:t>
+              <a:t>Prompt </a:t>
             </a:r>
             <a:r>
               <a:rPr lang="en-US" dirty="0">

</xml_diff>